<commit_message>
Updated mySQL Values slide
</commit_message>
<xml_diff>
--- a/Project/Project0.pptx
+++ b/Project/Project0.pptx
@@ -5,10 +5,10 @@
     <p:sldMasterId id="2147483648" r:id="rId4"/>
   </p:sldMasterIdLst>
   <p:notesMasterIdLst>
-    <p:notesMasterId r:id="rId43"/>
+    <p:notesMasterId r:id="rId44"/>
   </p:notesMasterIdLst>
   <p:handoutMasterIdLst>
-    <p:handoutMasterId r:id="rId44"/>
+    <p:handoutMasterId r:id="rId45"/>
   </p:handoutMasterIdLst>
   <p:sldIdLst>
     <p:sldId id="314" r:id="rId5"/>
@@ -26,29 +26,30 @@
     <p:sldId id="358" r:id="rId17"/>
     <p:sldId id="359" r:id="rId18"/>
     <p:sldId id="364" r:id="rId19"/>
-    <p:sldId id="333" r:id="rId20"/>
-    <p:sldId id="355" r:id="rId21"/>
-    <p:sldId id="348" r:id="rId22"/>
-    <p:sldId id="349" r:id="rId23"/>
-    <p:sldId id="350" r:id="rId24"/>
-    <p:sldId id="347" r:id="rId25"/>
-    <p:sldId id="334" r:id="rId26"/>
-    <p:sldId id="337" r:id="rId27"/>
-    <p:sldId id="338" r:id="rId28"/>
-    <p:sldId id="339" r:id="rId29"/>
-    <p:sldId id="365" r:id="rId30"/>
-    <p:sldId id="342" r:id="rId31"/>
-    <p:sldId id="351" r:id="rId32"/>
-    <p:sldId id="345" r:id="rId33"/>
-    <p:sldId id="343" r:id="rId34"/>
-    <p:sldId id="344" r:id="rId35"/>
-    <p:sldId id="352" r:id="rId36"/>
-    <p:sldId id="353" r:id="rId37"/>
-    <p:sldId id="356" r:id="rId38"/>
-    <p:sldId id="336" r:id="rId39"/>
-    <p:sldId id="328" r:id="rId40"/>
-    <p:sldId id="346" r:id="rId41"/>
-    <p:sldId id="331" r:id="rId42"/>
+    <p:sldId id="366" r:id="rId20"/>
+    <p:sldId id="333" r:id="rId21"/>
+    <p:sldId id="355" r:id="rId22"/>
+    <p:sldId id="348" r:id="rId23"/>
+    <p:sldId id="349" r:id="rId24"/>
+    <p:sldId id="350" r:id="rId25"/>
+    <p:sldId id="347" r:id="rId26"/>
+    <p:sldId id="334" r:id="rId27"/>
+    <p:sldId id="337" r:id="rId28"/>
+    <p:sldId id="338" r:id="rId29"/>
+    <p:sldId id="339" r:id="rId30"/>
+    <p:sldId id="365" r:id="rId31"/>
+    <p:sldId id="342" r:id="rId32"/>
+    <p:sldId id="351" r:id="rId33"/>
+    <p:sldId id="345" r:id="rId34"/>
+    <p:sldId id="343" r:id="rId35"/>
+    <p:sldId id="344" r:id="rId36"/>
+    <p:sldId id="352" r:id="rId37"/>
+    <p:sldId id="353" r:id="rId38"/>
+    <p:sldId id="356" r:id="rId39"/>
+    <p:sldId id="336" r:id="rId40"/>
+    <p:sldId id="328" r:id="rId41"/>
+    <p:sldId id="346" r:id="rId42"/>
+    <p:sldId id="331" r:id="rId43"/>
   </p:sldIdLst>
   <p:sldSz cx="12192000" cy="6858000"/>
   <p:notesSz cx="6858000" cy="9144000"/>
@@ -167,6 +168,7 @@
             <p14:sldId id="358"/>
             <p14:sldId id="359"/>
             <p14:sldId id="364"/>
+            <p14:sldId id="366"/>
             <p14:sldId id="333"/>
             <p14:sldId id="355"/>
             <p14:sldId id="348"/>
@@ -23183,6 +23185,167 @@
   <p:cSld>
     <p:spTree>
       <p:nvGrpSpPr>
+        <p:cNvPr id="1" name="">
+          <a:extLst>
+            <a:ext uri="{FF2B5EF4-FFF2-40B4-BE49-F238E27FC236}">
+              <a16:creationId xmlns:a16="http://schemas.microsoft.com/office/drawing/2014/main" id="{97879FF9-8F91-46BA-F034-7E721BCDA0E3}"/>
+            </a:ext>
+          </a:extLst>
+        </p:cNvPr>
+        <p:cNvGrpSpPr/>
+        <p:nvPr/>
+      </p:nvGrpSpPr>
+      <p:grpSpPr>
+        <a:xfrm>
+          <a:off x="0" y="0"/>
+          <a:ext cx="0" cy="0"/>
+          <a:chOff x="0" y="0"/>
+          <a:chExt cx="0" cy="0"/>
+        </a:xfrm>
+      </p:grpSpPr>
+      <p:sp>
+        <p:nvSpPr>
+          <p:cNvPr id="2" name="Title 1">
+            <a:extLst>
+              <a:ext uri="{FF2B5EF4-FFF2-40B4-BE49-F238E27FC236}">
+                <a16:creationId xmlns:a16="http://schemas.microsoft.com/office/drawing/2014/main" id="{EEF28790-FA33-3B3C-1CD7-71EA2EE785EC}"/>
+              </a:ext>
+            </a:extLst>
+          </p:cNvPr>
+          <p:cNvSpPr>
+            <a:spLocks noGrp="1"/>
+          </p:cNvSpPr>
+          <p:nvPr>
+            <p:ph type="title"/>
+          </p:nvPr>
+        </p:nvSpPr>
+        <p:spPr>
+          <a:xfrm>
+            <a:off x="661556" y="422467"/>
+            <a:ext cx="10244742" cy="961899"/>
+          </a:xfrm>
+        </p:spPr>
+        <p:txBody>
+          <a:bodyPr/>
+          <a:lstStyle/>
+          <a:p>
+            <a:r>
+              <a:rPr lang="en-US" dirty="0" err="1"/>
+              <a:t>mySQL</a:t>
+            </a:r>
+            <a:r>
+              <a:rPr lang="en-US" dirty="0"/>
+              <a:t> generated values</a:t>
+            </a:r>
+          </a:p>
+        </p:txBody>
+      </p:sp>
+      <p:sp>
+        <p:nvSpPr>
+          <p:cNvPr id="4" name="Footer Placeholder 3">
+            <a:extLst>
+              <a:ext uri="{FF2B5EF4-FFF2-40B4-BE49-F238E27FC236}">
+                <a16:creationId xmlns:a16="http://schemas.microsoft.com/office/drawing/2014/main" id="{D0443282-B88F-F03F-2230-711587932561}"/>
+              </a:ext>
+            </a:extLst>
+          </p:cNvPr>
+          <p:cNvSpPr>
+            <a:spLocks noGrp="1"/>
+          </p:cNvSpPr>
+          <p:nvPr>
+            <p:ph type="ftr" sz="quarter" idx="10"/>
+          </p:nvPr>
+        </p:nvSpPr>
+        <p:spPr/>
+        <p:txBody>
+          <a:bodyPr/>
+          <a:lstStyle/>
+          <a:p>
+            <a:r>
+              <a:rPr lang="en-US" dirty="0"/>
+              <a:t>PROJECT 0</a:t>
+            </a:r>
+          </a:p>
+        </p:txBody>
+      </p:sp>
+      <p:sp>
+        <p:nvSpPr>
+          <p:cNvPr id="5" name="Slide Number Placeholder 4">
+            <a:extLst>
+              <a:ext uri="{FF2B5EF4-FFF2-40B4-BE49-F238E27FC236}">
+                <a16:creationId xmlns:a16="http://schemas.microsoft.com/office/drawing/2014/main" id="{7AE7BF40-AC30-D606-9EB3-D82DE4A615DB}"/>
+              </a:ext>
+            </a:extLst>
+          </p:cNvPr>
+          <p:cNvSpPr>
+            <a:spLocks noGrp="1"/>
+          </p:cNvSpPr>
+          <p:nvPr>
+            <p:ph type="sldNum" sz="quarter" idx="11"/>
+          </p:nvPr>
+        </p:nvSpPr>
+        <p:spPr/>
+        <p:txBody>
+          <a:bodyPr/>
+          <a:lstStyle/>
+          <a:p>
+            <a:fld id="{B5CEABB6-07DC-46E8-9B57-56EC44A396E5}" type="slidenum">
+              <a:rPr lang="en-US" smtClean="0"/>
+              <a:pPr/>
+              <a:t>16</a:t>
+            </a:fld>
+            <a:endParaRPr lang="en-US" dirty="0"/>
+          </a:p>
+        </p:txBody>
+      </p:sp>
+      <p:pic>
+        <p:nvPicPr>
+          <p:cNvPr id="10" name="Picture 9">
+            <a:extLst>
+              <a:ext uri="{FF2B5EF4-FFF2-40B4-BE49-F238E27FC236}">
+                <a16:creationId xmlns:a16="http://schemas.microsoft.com/office/drawing/2014/main" id="{4DC0C6F1-47F2-E8BA-DC9D-56D8901BF344}"/>
+              </a:ext>
+            </a:extLst>
+          </p:cNvPr>
+          <p:cNvPicPr>
+            <a:picLocks noChangeAspect="1"/>
+          </p:cNvPicPr>
+          <p:nvPr/>
+        </p:nvPicPr>
+        <p:blipFill>
+          <a:blip r:embed="rId2"/>
+          <a:stretch>
+            <a:fillRect/>
+          </a:stretch>
+        </p:blipFill>
+        <p:spPr>
+          <a:xfrm>
+            <a:off x="0" y="2505027"/>
+            <a:ext cx="12191999" cy="1847945"/>
+          </a:xfrm>
+          <a:prstGeom prst="rect">
+            <a:avLst/>
+          </a:prstGeom>
+        </p:spPr>
+      </p:pic>
+    </p:spTree>
+    <p:extLst>
+      <p:ext uri="{BB962C8B-B14F-4D97-AF65-F5344CB8AC3E}">
+        <p14:creationId xmlns:p14="http://schemas.microsoft.com/office/powerpoint/2010/main" val="908781299"/>
+      </p:ext>
+    </p:extLst>
+  </p:cSld>
+  <p:clrMapOvr>
+    <a:masterClrMapping/>
+  </p:clrMapOvr>
+</p:sld>
+</file>
+
+<file path=ppt/slides/slide17.xml><?xml version="1.0" encoding="utf-8"?>
+<p:sld xmlns:a="http://schemas.openxmlformats.org/drawingml/2006/main" xmlns:r="http://schemas.openxmlformats.org/officeDocument/2006/relationships" xmlns:p="http://schemas.openxmlformats.org/presentationml/2006/main">
+  <p:cSld>
+    <p:spTree>
+      <p:nvGrpSpPr>
         <p:cNvPr id="1" name=""/>
         <p:cNvGrpSpPr/>
         <p:nvPr/>
@@ -23305,7 +23468,7 @@
             <a:fld id="{B5CEABB6-07DC-46E8-9B57-56EC44A396E5}" type="slidenum">
               <a:rPr lang="en-US" smtClean="0"/>
               <a:pPr/>
-              <a:t>16</a:t>
+              <a:t>17</a:t>
             </a:fld>
             <a:endParaRPr lang="en-US" dirty="0"/>
           </a:p>
@@ -23355,7 +23518,7 @@
 </p:sld>
 </file>
 
-<file path=ppt/slides/slide17.xml><?xml version="1.0" encoding="utf-8"?>
+<file path=ppt/slides/slide18.xml><?xml version="1.0" encoding="utf-8"?>
 <p:sld xmlns:a="http://schemas.openxmlformats.org/drawingml/2006/main" xmlns:r="http://schemas.openxmlformats.org/officeDocument/2006/relationships" xmlns:p="http://schemas.openxmlformats.org/presentationml/2006/main">
   <p:cSld>
     <p:spTree>
@@ -23483,7 +23646,7 @@
             <a:fld id="{B5CEABB6-07DC-46E8-9B57-56EC44A396E5}" type="slidenum">
               <a:rPr lang="en-US" smtClean="0"/>
               <a:pPr/>
-              <a:t>17</a:t>
+              <a:t>18</a:t>
             </a:fld>
             <a:endParaRPr lang="en-US" dirty="0"/>
           </a:p>
@@ -23533,7 +23696,7 @@
 </p:sld>
 </file>
 
-<file path=ppt/slides/slide18.xml><?xml version="1.0" encoding="utf-8"?>
+<file path=ppt/slides/slide19.xml><?xml version="1.0" encoding="utf-8"?>
 <p:sld xmlns:a="http://schemas.openxmlformats.org/drawingml/2006/main" xmlns:r="http://schemas.openxmlformats.org/officeDocument/2006/relationships" xmlns:p="http://schemas.openxmlformats.org/presentationml/2006/main">
   <p:cSld>
     <p:spTree>
@@ -23636,7 +23799,7 @@
             <a:fld id="{B5CEABB6-07DC-46E8-9B57-56EC44A396E5}" type="slidenum">
               <a:rPr lang="en-US" smtClean="0"/>
               <a:pPr/>
-              <a:t>18</a:t>
+              <a:t>19</a:t>
             </a:fld>
             <a:endParaRPr lang="en-US" dirty="0"/>
           </a:p>
@@ -23716,7 +23879,313 @@
 </p:sld>
 </file>
 
-<file path=ppt/slides/slide19.xml><?xml version="1.0" encoding="utf-8"?>
+<file path=ppt/slides/slide2.xml><?xml version="1.0" encoding="utf-8"?>
+<p:sld xmlns:a="http://schemas.openxmlformats.org/drawingml/2006/main" xmlns:r="http://schemas.openxmlformats.org/officeDocument/2006/relationships" xmlns:p="http://schemas.openxmlformats.org/presentationml/2006/main">
+  <p:cSld>
+    <p:spTree>
+      <p:nvGrpSpPr>
+        <p:cNvPr id="1" name=""/>
+        <p:cNvGrpSpPr/>
+        <p:nvPr/>
+      </p:nvGrpSpPr>
+      <p:grpSpPr>
+        <a:xfrm>
+          <a:off x="0" y="0"/>
+          <a:ext cx="0" cy="0"/>
+          <a:chOff x="0" y="0"/>
+          <a:chExt cx="0" cy="0"/>
+        </a:xfrm>
+      </p:grpSpPr>
+      <p:sp>
+        <p:nvSpPr>
+          <p:cNvPr id="2" name="Title 1">
+            <a:extLst>
+              <a:ext uri="{FF2B5EF4-FFF2-40B4-BE49-F238E27FC236}">
+                <a16:creationId xmlns:a16="http://schemas.microsoft.com/office/drawing/2014/main" id="{A2E2ABBA-2E6D-E7DD-AC67-58D1FCB3F346}"/>
+              </a:ext>
+            </a:extLst>
+          </p:cNvPr>
+          <p:cNvSpPr>
+            <a:spLocks noGrp="1"/>
+          </p:cNvSpPr>
+          <p:nvPr>
+            <p:ph type="title"/>
+          </p:nvPr>
+        </p:nvSpPr>
+        <p:spPr/>
+        <p:txBody>
+          <a:bodyPr/>
+          <a:lstStyle/>
+          <a:p>
+            <a:r>
+              <a:rPr lang="en-US" dirty="0"/>
+              <a:t>Agenda</a:t>
+            </a:r>
+          </a:p>
+        </p:txBody>
+      </p:sp>
+      <p:pic>
+        <p:nvPicPr>
+          <p:cNvPr id="12" name="Picture Placeholder 11" descr="Badge with checkmark">
+            <a:extLst>
+              <a:ext uri="{FF2B5EF4-FFF2-40B4-BE49-F238E27FC236}">
+                <a16:creationId xmlns:a16="http://schemas.microsoft.com/office/drawing/2014/main" id="{7ACB77E6-BC5F-1BC1-CA97-6D2E37F39C9B}"/>
+              </a:ext>
+            </a:extLst>
+          </p:cNvPr>
+          <p:cNvPicPr>
+            <a:picLocks noGrp="1" noChangeAspect="1"/>
+          </p:cNvPicPr>
+          <p:nvPr>
+            <p:ph type="pic" sz="quarter" idx="23"/>
+          </p:nvPr>
+        </p:nvPicPr>
+        <p:blipFill>
+          <a:blip r:embed="rId2">
+            <a:extLst>
+              <a:ext uri="{28A0092B-C50C-407E-A947-70E740481C1C}">
+                <a14:useLocalDpi xmlns:a14="http://schemas.microsoft.com/office/drawing/2010/main" val="0"/>
+              </a:ext>
+              <a:ext uri="{96DAC541-7B7A-43D3-8B79-37D633B846F1}">
+                <asvg:svgBlip xmlns:asvg="http://schemas.microsoft.com/office/drawing/2016/SVG/main" r:embed="rId3"/>
+              </a:ext>
+            </a:extLst>
+          </a:blip>
+          <a:srcRect/>
+          <a:stretch>
+            <a:fillRect/>
+          </a:stretch>
+        </p:blipFill>
+        <p:spPr/>
+      </p:pic>
+      <p:sp>
+        <p:nvSpPr>
+          <p:cNvPr id="5" name="Text Placeholder 4">
+            <a:extLst>
+              <a:ext uri="{FF2B5EF4-FFF2-40B4-BE49-F238E27FC236}">
+                <a16:creationId xmlns:a16="http://schemas.microsoft.com/office/drawing/2014/main" id="{59401105-5841-28D0-D6C0-3E1A46648BFE}"/>
+              </a:ext>
+            </a:extLst>
+          </p:cNvPr>
+          <p:cNvSpPr>
+            <a:spLocks noGrp="1"/>
+          </p:cNvSpPr>
+          <p:nvPr>
+            <p:ph type="body" sz="quarter" idx="13"/>
+          </p:nvPr>
+        </p:nvSpPr>
+        <p:spPr/>
+        <p:txBody>
+          <a:bodyPr/>
+          <a:lstStyle/>
+          <a:p>
+            <a:r>
+              <a:rPr lang="en-US" sz="3200" dirty="0"/>
+              <a:t>Purpose of these variables</a:t>
+            </a:r>
+          </a:p>
+          <a:p>
+            <a:endParaRPr lang="en-US" dirty="0"/>
+          </a:p>
+        </p:txBody>
+      </p:sp>
+      <p:pic>
+        <p:nvPicPr>
+          <p:cNvPr id="16" name="Picture Placeholder 15" descr="Badge with checkmark">
+            <a:extLst>
+              <a:ext uri="{FF2B5EF4-FFF2-40B4-BE49-F238E27FC236}">
+                <a16:creationId xmlns:a16="http://schemas.microsoft.com/office/drawing/2014/main" id="{41353449-F29F-160E-215E-BB307C73E339}"/>
+              </a:ext>
+            </a:extLst>
+          </p:cNvPr>
+          <p:cNvPicPr>
+            <a:picLocks noGrp="1" noChangeAspect="1"/>
+          </p:cNvPicPr>
+          <p:nvPr>
+            <p:ph type="pic" sz="quarter" idx="27"/>
+          </p:nvPr>
+        </p:nvPicPr>
+        <p:blipFill>
+          <a:blip r:embed="rId2">
+            <a:extLst>
+              <a:ext uri="{28A0092B-C50C-407E-A947-70E740481C1C}">
+                <a14:useLocalDpi xmlns:a14="http://schemas.microsoft.com/office/drawing/2010/main" val="0"/>
+              </a:ext>
+              <a:ext uri="{96DAC541-7B7A-43D3-8B79-37D633B846F1}">
+                <asvg:svgBlip xmlns:asvg="http://schemas.microsoft.com/office/drawing/2016/SVG/main" r:embed="rId3"/>
+              </a:ext>
+            </a:extLst>
+          </a:blip>
+          <a:srcRect/>
+          <a:stretch>
+            <a:fillRect/>
+          </a:stretch>
+        </p:blipFill>
+        <p:spPr/>
+      </p:pic>
+      <p:sp>
+        <p:nvSpPr>
+          <p:cNvPr id="7" name="Text Placeholder 6">
+            <a:extLst>
+              <a:ext uri="{FF2B5EF4-FFF2-40B4-BE49-F238E27FC236}">
+                <a16:creationId xmlns:a16="http://schemas.microsoft.com/office/drawing/2014/main" id="{33A858E6-8813-CD9D-EE22-EB8E062FBA14}"/>
+              </a:ext>
+            </a:extLst>
+          </p:cNvPr>
+          <p:cNvSpPr>
+            <a:spLocks noGrp="1"/>
+          </p:cNvSpPr>
+          <p:nvPr>
+            <p:ph type="body" sz="quarter" idx="24"/>
+          </p:nvPr>
+        </p:nvSpPr>
+        <p:spPr/>
+        <p:txBody>
+          <a:bodyPr/>
+          <a:lstStyle/>
+          <a:p>
+            <a:r>
+              <a:rPr lang="en-US" sz="3200" dirty="0"/>
+              <a:t>Analyze the data</a:t>
+            </a:r>
+            <a:endParaRPr lang="en-US" dirty="0"/>
+          </a:p>
+        </p:txBody>
+      </p:sp>
+      <p:pic>
+        <p:nvPicPr>
+          <p:cNvPr id="24" name="Picture Placeholder 23" descr="Badge with checkmark">
+            <a:extLst>
+              <a:ext uri="{FF2B5EF4-FFF2-40B4-BE49-F238E27FC236}">
+                <a16:creationId xmlns:a16="http://schemas.microsoft.com/office/drawing/2014/main" id="{F2D23F06-5068-6EAF-10FC-42E0A8F65A5B}"/>
+              </a:ext>
+            </a:extLst>
+          </p:cNvPr>
+          <p:cNvPicPr>
+            <a:picLocks noGrp="1" noChangeAspect="1"/>
+          </p:cNvPicPr>
+          <p:nvPr>
+            <p:ph type="pic" sz="quarter" idx="28"/>
+          </p:nvPr>
+        </p:nvPicPr>
+        <p:blipFill>
+          <a:blip r:embed="rId2">
+            <a:extLst>
+              <a:ext uri="{28A0092B-C50C-407E-A947-70E740481C1C}">
+                <a14:useLocalDpi xmlns:a14="http://schemas.microsoft.com/office/drawing/2010/main" val="0"/>
+              </a:ext>
+              <a:ext uri="{96DAC541-7B7A-43D3-8B79-37D633B846F1}">
+                <asvg:svgBlip xmlns:asvg="http://schemas.microsoft.com/office/drawing/2016/SVG/main" r:embed="rId3"/>
+              </a:ext>
+            </a:extLst>
+          </a:blip>
+          <a:srcRect/>
+          <a:stretch>
+            <a:fillRect/>
+          </a:stretch>
+        </p:blipFill>
+        <p:spPr/>
+      </p:pic>
+      <p:sp>
+        <p:nvSpPr>
+          <p:cNvPr id="8" name="Text Placeholder 7">
+            <a:extLst>
+              <a:ext uri="{FF2B5EF4-FFF2-40B4-BE49-F238E27FC236}">
+                <a16:creationId xmlns:a16="http://schemas.microsoft.com/office/drawing/2014/main" id="{CE80F9D7-8410-9097-31BC-A9AE7C7052A9}"/>
+              </a:ext>
+            </a:extLst>
+          </p:cNvPr>
+          <p:cNvSpPr>
+            <a:spLocks noGrp="1"/>
+          </p:cNvSpPr>
+          <p:nvPr>
+            <p:ph type="body" sz="quarter" idx="26"/>
+          </p:nvPr>
+        </p:nvSpPr>
+        <p:spPr/>
+        <p:txBody>
+          <a:bodyPr/>
+          <a:lstStyle/>
+          <a:p>
+            <a:r>
+              <a:rPr lang="en-US" sz="3200" dirty="0"/>
+              <a:t>Q&amp;A</a:t>
+            </a:r>
+          </a:p>
+        </p:txBody>
+      </p:sp>
+      <p:sp>
+        <p:nvSpPr>
+          <p:cNvPr id="3" name="Footer Placeholder 2">
+            <a:extLst>
+              <a:ext uri="{FF2B5EF4-FFF2-40B4-BE49-F238E27FC236}">
+                <a16:creationId xmlns:a16="http://schemas.microsoft.com/office/drawing/2014/main" id="{9C3F16C9-B662-209D-15DE-55D714B28413}"/>
+              </a:ext>
+            </a:extLst>
+          </p:cNvPr>
+          <p:cNvSpPr>
+            <a:spLocks noGrp="1"/>
+          </p:cNvSpPr>
+          <p:nvPr>
+            <p:ph type="ftr" sz="quarter" idx="10"/>
+          </p:nvPr>
+        </p:nvSpPr>
+        <p:spPr/>
+        <p:txBody>
+          <a:bodyPr/>
+          <a:lstStyle/>
+          <a:p>
+            <a:r>
+              <a:rPr lang="en-US" dirty="0"/>
+              <a:t>Project 0</a:t>
+            </a:r>
+          </a:p>
+        </p:txBody>
+      </p:sp>
+      <p:sp>
+        <p:nvSpPr>
+          <p:cNvPr id="4" name="Slide Number Placeholder 3">
+            <a:extLst>
+              <a:ext uri="{FF2B5EF4-FFF2-40B4-BE49-F238E27FC236}">
+                <a16:creationId xmlns:a16="http://schemas.microsoft.com/office/drawing/2014/main" id="{804DA4DD-2363-F475-FCAA-A686AA9F99AC}"/>
+              </a:ext>
+            </a:extLst>
+          </p:cNvPr>
+          <p:cNvSpPr>
+            <a:spLocks noGrp="1"/>
+          </p:cNvSpPr>
+          <p:nvPr>
+            <p:ph type="sldNum" sz="quarter" idx="11"/>
+          </p:nvPr>
+        </p:nvSpPr>
+        <p:spPr/>
+        <p:txBody>
+          <a:bodyPr/>
+          <a:lstStyle/>
+          <a:p>
+            <a:fld id="{B5CEABB6-07DC-46E8-9B57-56EC44A396E5}" type="slidenum">
+              <a:rPr lang="en-US" smtClean="0"/>
+              <a:pPr/>
+              <a:t>2</a:t>
+            </a:fld>
+            <a:endParaRPr lang="en-US" dirty="0"/>
+          </a:p>
+        </p:txBody>
+      </p:sp>
+    </p:spTree>
+    <p:extLst>
+      <p:ext uri="{BB962C8B-B14F-4D97-AF65-F5344CB8AC3E}">
+        <p14:creationId xmlns:p14="http://schemas.microsoft.com/office/powerpoint/2010/main" val="4294866199"/>
+      </p:ext>
+    </p:extLst>
+  </p:cSld>
+  <p:clrMapOvr>
+    <a:masterClrMapping/>
+  </p:clrMapOvr>
+</p:sld>
+</file>
+
+<file path=ppt/slides/slide20.xml><?xml version="1.0" encoding="utf-8"?>
 <p:sld xmlns:a="http://schemas.openxmlformats.org/drawingml/2006/main" xmlns:r="http://schemas.openxmlformats.org/officeDocument/2006/relationships" xmlns:p="http://schemas.openxmlformats.org/presentationml/2006/main">
   <p:cSld>
     <p:spTree>
@@ -23819,7 +24288,7 @@
             <a:fld id="{B5CEABB6-07DC-46E8-9B57-56EC44A396E5}" type="slidenum">
               <a:rPr lang="en-US" smtClean="0"/>
               <a:pPr/>
-              <a:t>19</a:t>
+              <a:t>20</a:t>
             </a:fld>
             <a:endParaRPr lang="en-US" dirty="0"/>
           </a:p>
@@ -23869,313 +24338,7 @@
 </p:sld>
 </file>
 
-<file path=ppt/slides/slide2.xml><?xml version="1.0" encoding="utf-8"?>
-<p:sld xmlns:a="http://schemas.openxmlformats.org/drawingml/2006/main" xmlns:r="http://schemas.openxmlformats.org/officeDocument/2006/relationships" xmlns:p="http://schemas.openxmlformats.org/presentationml/2006/main">
-  <p:cSld>
-    <p:spTree>
-      <p:nvGrpSpPr>
-        <p:cNvPr id="1" name=""/>
-        <p:cNvGrpSpPr/>
-        <p:nvPr/>
-      </p:nvGrpSpPr>
-      <p:grpSpPr>
-        <a:xfrm>
-          <a:off x="0" y="0"/>
-          <a:ext cx="0" cy="0"/>
-          <a:chOff x="0" y="0"/>
-          <a:chExt cx="0" cy="0"/>
-        </a:xfrm>
-      </p:grpSpPr>
-      <p:sp>
-        <p:nvSpPr>
-          <p:cNvPr id="2" name="Title 1">
-            <a:extLst>
-              <a:ext uri="{FF2B5EF4-FFF2-40B4-BE49-F238E27FC236}">
-                <a16:creationId xmlns:a16="http://schemas.microsoft.com/office/drawing/2014/main" id="{A2E2ABBA-2E6D-E7DD-AC67-58D1FCB3F346}"/>
-              </a:ext>
-            </a:extLst>
-          </p:cNvPr>
-          <p:cNvSpPr>
-            <a:spLocks noGrp="1"/>
-          </p:cNvSpPr>
-          <p:nvPr>
-            <p:ph type="title"/>
-          </p:nvPr>
-        </p:nvSpPr>
-        <p:spPr/>
-        <p:txBody>
-          <a:bodyPr/>
-          <a:lstStyle/>
-          <a:p>
-            <a:r>
-              <a:rPr lang="en-US" dirty="0"/>
-              <a:t>Agenda</a:t>
-            </a:r>
-          </a:p>
-        </p:txBody>
-      </p:sp>
-      <p:pic>
-        <p:nvPicPr>
-          <p:cNvPr id="12" name="Picture Placeholder 11" descr="Badge with checkmark">
-            <a:extLst>
-              <a:ext uri="{FF2B5EF4-FFF2-40B4-BE49-F238E27FC236}">
-                <a16:creationId xmlns:a16="http://schemas.microsoft.com/office/drawing/2014/main" id="{7ACB77E6-BC5F-1BC1-CA97-6D2E37F39C9B}"/>
-              </a:ext>
-            </a:extLst>
-          </p:cNvPr>
-          <p:cNvPicPr>
-            <a:picLocks noGrp="1" noChangeAspect="1"/>
-          </p:cNvPicPr>
-          <p:nvPr>
-            <p:ph type="pic" sz="quarter" idx="23"/>
-          </p:nvPr>
-        </p:nvPicPr>
-        <p:blipFill>
-          <a:blip r:embed="rId2">
-            <a:extLst>
-              <a:ext uri="{28A0092B-C50C-407E-A947-70E740481C1C}">
-                <a14:useLocalDpi xmlns:a14="http://schemas.microsoft.com/office/drawing/2010/main" val="0"/>
-              </a:ext>
-              <a:ext uri="{96DAC541-7B7A-43D3-8B79-37D633B846F1}">
-                <asvg:svgBlip xmlns:asvg="http://schemas.microsoft.com/office/drawing/2016/SVG/main" r:embed="rId3"/>
-              </a:ext>
-            </a:extLst>
-          </a:blip>
-          <a:srcRect/>
-          <a:stretch>
-            <a:fillRect/>
-          </a:stretch>
-        </p:blipFill>
-        <p:spPr/>
-      </p:pic>
-      <p:sp>
-        <p:nvSpPr>
-          <p:cNvPr id="5" name="Text Placeholder 4">
-            <a:extLst>
-              <a:ext uri="{FF2B5EF4-FFF2-40B4-BE49-F238E27FC236}">
-                <a16:creationId xmlns:a16="http://schemas.microsoft.com/office/drawing/2014/main" id="{59401105-5841-28D0-D6C0-3E1A46648BFE}"/>
-              </a:ext>
-            </a:extLst>
-          </p:cNvPr>
-          <p:cNvSpPr>
-            <a:spLocks noGrp="1"/>
-          </p:cNvSpPr>
-          <p:nvPr>
-            <p:ph type="body" sz="quarter" idx="13"/>
-          </p:nvPr>
-        </p:nvSpPr>
-        <p:spPr/>
-        <p:txBody>
-          <a:bodyPr/>
-          <a:lstStyle/>
-          <a:p>
-            <a:r>
-              <a:rPr lang="en-US" sz="3200" dirty="0"/>
-              <a:t>Purpose of these variables</a:t>
-            </a:r>
-          </a:p>
-          <a:p>
-            <a:endParaRPr lang="en-US" dirty="0"/>
-          </a:p>
-        </p:txBody>
-      </p:sp>
-      <p:pic>
-        <p:nvPicPr>
-          <p:cNvPr id="16" name="Picture Placeholder 15" descr="Badge with checkmark">
-            <a:extLst>
-              <a:ext uri="{FF2B5EF4-FFF2-40B4-BE49-F238E27FC236}">
-                <a16:creationId xmlns:a16="http://schemas.microsoft.com/office/drawing/2014/main" id="{41353449-F29F-160E-215E-BB307C73E339}"/>
-              </a:ext>
-            </a:extLst>
-          </p:cNvPr>
-          <p:cNvPicPr>
-            <a:picLocks noGrp="1" noChangeAspect="1"/>
-          </p:cNvPicPr>
-          <p:nvPr>
-            <p:ph type="pic" sz="quarter" idx="27"/>
-          </p:nvPr>
-        </p:nvPicPr>
-        <p:blipFill>
-          <a:blip r:embed="rId2">
-            <a:extLst>
-              <a:ext uri="{28A0092B-C50C-407E-A947-70E740481C1C}">
-                <a14:useLocalDpi xmlns:a14="http://schemas.microsoft.com/office/drawing/2010/main" val="0"/>
-              </a:ext>
-              <a:ext uri="{96DAC541-7B7A-43D3-8B79-37D633B846F1}">
-                <asvg:svgBlip xmlns:asvg="http://schemas.microsoft.com/office/drawing/2016/SVG/main" r:embed="rId3"/>
-              </a:ext>
-            </a:extLst>
-          </a:blip>
-          <a:srcRect/>
-          <a:stretch>
-            <a:fillRect/>
-          </a:stretch>
-        </p:blipFill>
-        <p:spPr/>
-      </p:pic>
-      <p:sp>
-        <p:nvSpPr>
-          <p:cNvPr id="7" name="Text Placeholder 6">
-            <a:extLst>
-              <a:ext uri="{FF2B5EF4-FFF2-40B4-BE49-F238E27FC236}">
-                <a16:creationId xmlns:a16="http://schemas.microsoft.com/office/drawing/2014/main" id="{33A858E6-8813-CD9D-EE22-EB8E062FBA14}"/>
-              </a:ext>
-            </a:extLst>
-          </p:cNvPr>
-          <p:cNvSpPr>
-            <a:spLocks noGrp="1"/>
-          </p:cNvSpPr>
-          <p:nvPr>
-            <p:ph type="body" sz="quarter" idx="24"/>
-          </p:nvPr>
-        </p:nvSpPr>
-        <p:spPr/>
-        <p:txBody>
-          <a:bodyPr/>
-          <a:lstStyle/>
-          <a:p>
-            <a:r>
-              <a:rPr lang="en-US" sz="3200" dirty="0"/>
-              <a:t>Analyze the data</a:t>
-            </a:r>
-            <a:endParaRPr lang="en-US" dirty="0"/>
-          </a:p>
-        </p:txBody>
-      </p:sp>
-      <p:pic>
-        <p:nvPicPr>
-          <p:cNvPr id="24" name="Picture Placeholder 23" descr="Badge with checkmark">
-            <a:extLst>
-              <a:ext uri="{FF2B5EF4-FFF2-40B4-BE49-F238E27FC236}">
-                <a16:creationId xmlns:a16="http://schemas.microsoft.com/office/drawing/2014/main" id="{F2D23F06-5068-6EAF-10FC-42E0A8F65A5B}"/>
-              </a:ext>
-            </a:extLst>
-          </p:cNvPr>
-          <p:cNvPicPr>
-            <a:picLocks noGrp="1" noChangeAspect="1"/>
-          </p:cNvPicPr>
-          <p:nvPr>
-            <p:ph type="pic" sz="quarter" idx="28"/>
-          </p:nvPr>
-        </p:nvPicPr>
-        <p:blipFill>
-          <a:blip r:embed="rId2">
-            <a:extLst>
-              <a:ext uri="{28A0092B-C50C-407E-A947-70E740481C1C}">
-                <a14:useLocalDpi xmlns:a14="http://schemas.microsoft.com/office/drawing/2010/main" val="0"/>
-              </a:ext>
-              <a:ext uri="{96DAC541-7B7A-43D3-8B79-37D633B846F1}">
-                <asvg:svgBlip xmlns:asvg="http://schemas.microsoft.com/office/drawing/2016/SVG/main" r:embed="rId3"/>
-              </a:ext>
-            </a:extLst>
-          </a:blip>
-          <a:srcRect/>
-          <a:stretch>
-            <a:fillRect/>
-          </a:stretch>
-        </p:blipFill>
-        <p:spPr/>
-      </p:pic>
-      <p:sp>
-        <p:nvSpPr>
-          <p:cNvPr id="8" name="Text Placeholder 7">
-            <a:extLst>
-              <a:ext uri="{FF2B5EF4-FFF2-40B4-BE49-F238E27FC236}">
-                <a16:creationId xmlns:a16="http://schemas.microsoft.com/office/drawing/2014/main" id="{CE80F9D7-8410-9097-31BC-A9AE7C7052A9}"/>
-              </a:ext>
-            </a:extLst>
-          </p:cNvPr>
-          <p:cNvSpPr>
-            <a:spLocks noGrp="1"/>
-          </p:cNvSpPr>
-          <p:nvPr>
-            <p:ph type="body" sz="quarter" idx="26"/>
-          </p:nvPr>
-        </p:nvSpPr>
-        <p:spPr/>
-        <p:txBody>
-          <a:bodyPr/>
-          <a:lstStyle/>
-          <a:p>
-            <a:r>
-              <a:rPr lang="en-US" sz="3200" dirty="0"/>
-              <a:t>Q&amp;A</a:t>
-            </a:r>
-          </a:p>
-        </p:txBody>
-      </p:sp>
-      <p:sp>
-        <p:nvSpPr>
-          <p:cNvPr id="3" name="Footer Placeholder 2">
-            <a:extLst>
-              <a:ext uri="{FF2B5EF4-FFF2-40B4-BE49-F238E27FC236}">
-                <a16:creationId xmlns:a16="http://schemas.microsoft.com/office/drawing/2014/main" id="{9C3F16C9-B662-209D-15DE-55D714B28413}"/>
-              </a:ext>
-            </a:extLst>
-          </p:cNvPr>
-          <p:cNvSpPr>
-            <a:spLocks noGrp="1"/>
-          </p:cNvSpPr>
-          <p:nvPr>
-            <p:ph type="ftr" sz="quarter" idx="10"/>
-          </p:nvPr>
-        </p:nvSpPr>
-        <p:spPr/>
-        <p:txBody>
-          <a:bodyPr/>
-          <a:lstStyle/>
-          <a:p>
-            <a:r>
-              <a:rPr lang="en-US" dirty="0"/>
-              <a:t>Project 0</a:t>
-            </a:r>
-          </a:p>
-        </p:txBody>
-      </p:sp>
-      <p:sp>
-        <p:nvSpPr>
-          <p:cNvPr id="4" name="Slide Number Placeholder 3">
-            <a:extLst>
-              <a:ext uri="{FF2B5EF4-FFF2-40B4-BE49-F238E27FC236}">
-                <a16:creationId xmlns:a16="http://schemas.microsoft.com/office/drawing/2014/main" id="{804DA4DD-2363-F475-FCAA-A686AA9F99AC}"/>
-              </a:ext>
-            </a:extLst>
-          </p:cNvPr>
-          <p:cNvSpPr>
-            <a:spLocks noGrp="1"/>
-          </p:cNvSpPr>
-          <p:nvPr>
-            <p:ph type="sldNum" sz="quarter" idx="11"/>
-          </p:nvPr>
-        </p:nvSpPr>
-        <p:spPr/>
-        <p:txBody>
-          <a:bodyPr/>
-          <a:lstStyle/>
-          <a:p>
-            <a:fld id="{B5CEABB6-07DC-46E8-9B57-56EC44A396E5}" type="slidenum">
-              <a:rPr lang="en-US" smtClean="0"/>
-              <a:pPr/>
-              <a:t>2</a:t>
-            </a:fld>
-            <a:endParaRPr lang="en-US" dirty="0"/>
-          </a:p>
-        </p:txBody>
-      </p:sp>
-    </p:spTree>
-    <p:extLst>
-      <p:ext uri="{BB962C8B-B14F-4D97-AF65-F5344CB8AC3E}">
-        <p14:creationId xmlns:p14="http://schemas.microsoft.com/office/powerpoint/2010/main" val="4294866199"/>
-      </p:ext>
-    </p:extLst>
-  </p:cSld>
-  <p:clrMapOvr>
-    <a:masterClrMapping/>
-  </p:clrMapOvr>
-</p:sld>
-</file>
-
-<file path=ppt/slides/slide20.xml><?xml version="1.0" encoding="utf-8"?>
+<file path=ppt/slides/slide21.xml><?xml version="1.0" encoding="utf-8"?>
 <p:sld xmlns:a="http://schemas.openxmlformats.org/drawingml/2006/main" xmlns:r="http://schemas.openxmlformats.org/officeDocument/2006/relationships" xmlns:p="http://schemas.openxmlformats.org/presentationml/2006/main">
   <p:cSld>
     <p:spTree>
@@ -24278,7 +24441,7 @@
             <a:fld id="{B5CEABB6-07DC-46E8-9B57-56EC44A396E5}" type="slidenum">
               <a:rPr lang="en-US" smtClean="0"/>
               <a:pPr/>
-              <a:t>20</a:t>
+              <a:t>21</a:t>
             </a:fld>
             <a:endParaRPr lang="en-US" dirty="0"/>
           </a:p>
@@ -24328,7 +24491,7 @@
 </p:sld>
 </file>
 
-<file path=ppt/slides/slide21.xml><?xml version="1.0" encoding="utf-8"?>
+<file path=ppt/slides/slide22.xml><?xml version="1.0" encoding="utf-8"?>
 <p:sld xmlns:a="http://schemas.openxmlformats.org/drawingml/2006/main" xmlns:r="http://schemas.openxmlformats.org/officeDocument/2006/relationships" xmlns:p="http://schemas.openxmlformats.org/presentationml/2006/main">
   <p:cSld>
     <p:spTree>
@@ -24456,7 +24619,7 @@
             <a:fld id="{B5CEABB6-07DC-46E8-9B57-56EC44A396E5}" type="slidenum">
               <a:rPr lang="en-US" smtClean="0"/>
               <a:pPr/>
-              <a:t>21</a:t>
+              <a:t>22</a:t>
             </a:fld>
             <a:endParaRPr lang="en-US" dirty="0"/>
           </a:p>
@@ -24501,7 +24664,7 @@
 </p:sld>
 </file>
 
-<file path=ppt/slides/slide22.xml><?xml version="1.0" encoding="utf-8"?>
+<file path=ppt/slides/slide23.xml><?xml version="1.0" encoding="utf-8"?>
 <p:sld xmlns:a="http://schemas.openxmlformats.org/drawingml/2006/main" xmlns:r="http://schemas.openxmlformats.org/officeDocument/2006/relationships" xmlns:p="http://schemas.openxmlformats.org/presentationml/2006/main">
   <p:cSld>
     <p:spTree>
@@ -24629,7 +24792,7 @@
             <a:fld id="{B5CEABB6-07DC-46E8-9B57-56EC44A396E5}" type="slidenum">
               <a:rPr lang="en-US" smtClean="0"/>
               <a:pPr/>
-              <a:t>22</a:t>
+              <a:t>23</a:t>
             </a:fld>
             <a:endParaRPr lang="en-US" dirty="0"/>
           </a:p>
@@ -24679,7 +24842,7 @@
 </p:sld>
 </file>
 
-<file path=ppt/slides/slide23.xml><?xml version="1.0" encoding="utf-8"?>
+<file path=ppt/slides/slide24.xml><?xml version="1.0" encoding="utf-8"?>
 <p:sld xmlns:a="http://schemas.openxmlformats.org/drawingml/2006/main" xmlns:r="http://schemas.openxmlformats.org/officeDocument/2006/relationships" xmlns:p="http://schemas.openxmlformats.org/presentationml/2006/main">
   <p:cSld>
     <p:spTree>
@@ -24811,7 +24974,7 @@
             <a:fld id="{B5CEABB6-07DC-46E8-9B57-56EC44A396E5}" type="slidenum">
               <a:rPr lang="en-US" smtClean="0"/>
               <a:pPr/>
-              <a:t>23</a:t>
+              <a:t>24</a:t>
             </a:fld>
             <a:endParaRPr lang="en-US" dirty="0"/>
           </a:p>
@@ -24897,7 +25060,7 @@
 </p:sld>
 </file>
 
-<file path=ppt/slides/slide24.xml><?xml version="1.0" encoding="utf-8"?>
+<file path=ppt/slides/slide25.xml><?xml version="1.0" encoding="utf-8"?>
 <p:sld xmlns:a="http://schemas.openxmlformats.org/drawingml/2006/main" xmlns:r="http://schemas.openxmlformats.org/officeDocument/2006/relationships" xmlns:p="http://schemas.openxmlformats.org/presentationml/2006/main">
   <p:cSld>
     <p:spTree>
@@ -25029,7 +25192,7 @@
             <a:fld id="{B5CEABB6-07DC-46E8-9B57-56EC44A396E5}" type="slidenum">
               <a:rPr lang="en-US" smtClean="0"/>
               <a:pPr/>
-              <a:t>24</a:t>
+              <a:t>25</a:t>
             </a:fld>
             <a:endParaRPr lang="en-US" dirty="0"/>
           </a:p>
@@ -25115,7 +25278,7 @@
 </p:sld>
 </file>
 
-<file path=ppt/slides/slide25.xml><?xml version="1.0" encoding="utf-8"?>
+<file path=ppt/slides/slide26.xml><?xml version="1.0" encoding="utf-8"?>
 <p:sld xmlns:a="http://schemas.openxmlformats.org/drawingml/2006/main" xmlns:r="http://schemas.openxmlformats.org/officeDocument/2006/relationships" xmlns:p="http://schemas.openxmlformats.org/presentationml/2006/main">
   <p:cSld>
     <p:spTree>
@@ -25247,7 +25410,7 @@
             <a:fld id="{B5CEABB6-07DC-46E8-9B57-56EC44A396E5}" type="slidenum">
               <a:rPr lang="en-US" smtClean="0"/>
               <a:pPr/>
-              <a:t>25</a:t>
+              <a:t>26</a:t>
             </a:fld>
             <a:endParaRPr lang="en-US" dirty="0"/>
           </a:p>
@@ -25333,7 +25496,7 @@
 </p:sld>
 </file>
 
-<file path=ppt/slides/slide26.xml><?xml version="1.0" encoding="utf-8"?>
+<file path=ppt/slides/slide27.xml><?xml version="1.0" encoding="utf-8"?>
 <p:sld xmlns:a="http://schemas.openxmlformats.org/drawingml/2006/main" xmlns:r="http://schemas.openxmlformats.org/officeDocument/2006/relationships" xmlns:p="http://schemas.openxmlformats.org/presentationml/2006/main">
   <p:cSld>
     <p:spTree>
@@ -25475,7 +25638,7 @@
             <a:fld id="{B5CEABB6-07DC-46E8-9B57-56EC44A396E5}" type="slidenum">
               <a:rPr lang="en-US" smtClean="0"/>
               <a:pPr/>
-              <a:t>26</a:t>
+              <a:t>27</a:t>
             </a:fld>
             <a:endParaRPr lang="en-US" dirty="0"/>
           </a:p>
@@ -25494,7 +25657,7 @@
 </p:sld>
 </file>
 
-<file path=ppt/slides/slide27.xml><?xml version="1.0" encoding="utf-8"?>
+<file path=ppt/slides/slide28.xml><?xml version="1.0" encoding="utf-8"?>
 <p:sld xmlns:a="http://schemas.openxmlformats.org/drawingml/2006/main" xmlns:r="http://schemas.openxmlformats.org/officeDocument/2006/relationships" xmlns:p="http://schemas.openxmlformats.org/presentationml/2006/main">
   <p:cSld>
     <p:spTree>
@@ -25608,7 +25771,7 @@
             <a:fld id="{B5CEABB6-07DC-46E8-9B57-56EC44A396E5}" type="slidenum">
               <a:rPr lang="en-US" smtClean="0"/>
               <a:pPr/>
-              <a:t>27</a:t>
+              <a:t>28</a:t>
             </a:fld>
             <a:endParaRPr lang="en-US" dirty="0"/>
           </a:p>
@@ -25656,7 +25819,7 @@
 </p:sld>
 </file>
 
-<file path=ppt/slides/slide28.xml><?xml version="1.0" encoding="utf-8"?>
+<file path=ppt/slides/slide29.xml><?xml version="1.0" encoding="utf-8"?>
 <p:sld xmlns:a="http://schemas.openxmlformats.org/drawingml/2006/main" xmlns:r="http://schemas.openxmlformats.org/officeDocument/2006/relationships" xmlns:p="http://schemas.openxmlformats.org/presentationml/2006/main">
   <p:cSld>
     <p:spTree>
@@ -25770,7 +25933,7 @@
             <a:fld id="{B5CEABB6-07DC-46E8-9B57-56EC44A396E5}" type="slidenum">
               <a:rPr lang="en-US" smtClean="0"/>
               <a:pPr/>
-              <a:t>28</a:t>
+              <a:t>29</a:t>
             </a:fld>
             <a:endParaRPr lang="en-US" dirty="0"/>
           </a:p>
@@ -25810,169 +25973,6 @@
     <p:extLst>
       <p:ext uri="{BB962C8B-B14F-4D97-AF65-F5344CB8AC3E}">
         <p14:creationId xmlns:p14="http://schemas.microsoft.com/office/powerpoint/2010/main" val="859990297"/>
-      </p:ext>
-    </p:extLst>
-  </p:cSld>
-  <p:clrMapOvr>
-    <a:masterClrMapping/>
-  </p:clrMapOvr>
-</p:sld>
-</file>
-
-<file path=ppt/slides/slide29.xml><?xml version="1.0" encoding="utf-8"?>
-<p:sld xmlns:a="http://schemas.openxmlformats.org/drawingml/2006/main" xmlns:r="http://schemas.openxmlformats.org/officeDocument/2006/relationships" xmlns:p="http://schemas.openxmlformats.org/presentationml/2006/main">
-  <p:cSld>
-    <p:spTree>
-      <p:nvGrpSpPr>
-        <p:cNvPr id="1" name="">
-          <a:extLst>
-            <a:ext uri="{FF2B5EF4-FFF2-40B4-BE49-F238E27FC236}">
-              <a16:creationId xmlns:a16="http://schemas.microsoft.com/office/drawing/2014/main" id="{C740FE29-64DC-0E92-4212-52A2B42FEA26}"/>
-            </a:ext>
-          </a:extLst>
-        </p:cNvPr>
-        <p:cNvGrpSpPr/>
-        <p:nvPr/>
-      </p:nvGrpSpPr>
-      <p:grpSpPr>
-        <a:xfrm>
-          <a:off x="0" y="0"/>
-          <a:ext cx="0" cy="0"/>
-          <a:chOff x="0" y="0"/>
-          <a:chExt cx="0" cy="0"/>
-        </a:xfrm>
-      </p:grpSpPr>
-      <p:sp>
-        <p:nvSpPr>
-          <p:cNvPr id="2" name="Title 1">
-            <a:extLst>
-              <a:ext uri="{FF2B5EF4-FFF2-40B4-BE49-F238E27FC236}">
-                <a16:creationId xmlns:a16="http://schemas.microsoft.com/office/drawing/2014/main" id="{F59B3BF4-3AA5-B73F-26B5-22A3DE5BA2D1}"/>
-              </a:ext>
-            </a:extLst>
-          </p:cNvPr>
-          <p:cNvSpPr>
-            <a:spLocks noGrp="1"/>
-          </p:cNvSpPr>
-          <p:nvPr>
-            <p:ph type="title"/>
-          </p:nvPr>
-        </p:nvSpPr>
-        <p:spPr>
-          <a:xfrm>
-            <a:off x="811185" y="621973"/>
-            <a:ext cx="10361120" cy="961899"/>
-          </a:xfrm>
-        </p:spPr>
-        <p:txBody>
-          <a:bodyPr/>
-          <a:lstStyle/>
-          <a:p>
-            <a:r>
-              <a:rPr lang="en-US" dirty="0"/>
-              <a:t>Setting Primary Keys in </a:t>
-            </a:r>
-            <a:r>
-              <a:rPr lang="en-US" dirty="0" err="1"/>
-              <a:t>BigQuery</a:t>
-            </a:r>
-            <a:endParaRPr lang="en-US" dirty="0"/>
-          </a:p>
-        </p:txBody>
-      </p:sp>
-      <p:sp>
-        <p:nvSpPr>
-          <p:cNvPr id="4" name="Footer Placeholder 3">
-            <a:extLst>
-              <a:ext uri="{FF2B5EF4-FFF2-40B4-BE49-F238E27FC236}">
-                <a16:creationId xmlns:a16="http://schemas.microsoft.com/office/drawing/2014/main" id="{BE1687C8-45F2-818D-4A63-77B530F67267}"/>
-              </a:ext>
-            </a:extLst>
-          </p:cNvPr>
-          <p:cNvSpPr>
-            <a:spLocks noGrp="1"/>
-          </p:cNvSpPr>
-          <p:nvPr>
-            <p:ph type="ftr" sz="quarter" idx="10"/>
-          </p:nvPr>
-        </p:nvSpPr>
-        <p:spPr/>
-        <p:txBody>
-          <a:bodyPr/>
-          <a:lstStyle/>
-          <a:p>
-            <a:r>
-              <a:rPr lang="en-US"/>
-              <a:t>PRESENTATION TITLE</a:t>
-            </a:r>
-            <a:endParaRPr lang="en-US" dirty="0"/>
-          </a:p>
-        </p:txBody>
-      </p:sp>
-      <p:sp>
-        <p:nvSpPr>
-          <p:cNvPr id="5" name="Slide Number Placeholder 4">
-            <a:extLst>
-              <a:ext uri="{FF2B5EF4-FFF2-40B4-BE49-F238E27FC236}">
-                <a16:creationId xmlns:a16="http://schemas.microsoft.com/office/drawing/2014/main" id="{85D26533-9E3F-DAC3-2CB4-D8113D9716EA}"/>
-              </a:ext>
-            </a:extLst>
-          </p:cNvPr>
-          <p:cNvSpPr>
-            <a:spLocks noGrp="1"/>
-          </p:cNvSpPr>
-          <p:nvPr>
-            <p:ph type="sldNum" sz="quarter" idx="11"/>
-          </p:nvPr>
-        </p:nvSpPr>
-        <p:spPr/>
-        <p:txBody>
-          <a:bodyPr/>
-          <a:lstStyle/>
-          <a:p>
-            <a:fld id="{B5CEABB6-07DC-46E8-9B57-56EC44A396E5}" type="slidenum">
-              <a:rPr lang="en-US" smtClean="0"/>
-              <a:pPr/>
-              <a:t>29</a:t>
-            </a:fld>
-            <a:endParaRPr lang="en-US" dirty="0"/>
-          </a:p>
-        </p:txBody>
-      </p:sp>
-      <p:pic>
-        <p:nvPicPr>
-          <p:cNvPr id="6" name="Picture 5">
-            <a:extLst>
-              <a:ext uri="{FF2B5EF4-FFF2-40B4-BE49-F238E27FC236}">
-                <a16:creationId xmlns:a16="http://schemas.microsoft.com/office/drawing/2014/main" id="{A04633B2-A3C4-D744-7CC2-DB12833B777A}"/>
-              </a:ext>
-            </a:extLst>
-          </p:cNvPr>
-          <p:cNvPicPr>
-            <a:picLocks noChangeAspect="1"/>
-          </p:cNvPicPr>
-          <p:nvPr/>
-        </p:nvPicPr>
-        <p:blipFill>
-          <a:blip r:embed="rId2"/>
-          <a:stretch>
-            <a:fillRect/>
-          </a:stretch>
-        </p:blipFill>
-        <p:spPr>
-          <a:xfrm>
-            <a:off x="0" y="1192382"/>
-            <a:ext cx="11741753" cy="5753396"/>
-          </a:xfrm>
-          <a:prstGeom prst="rect">
-            <a:avLst/>
-          </a:prstGeom>
-        </p:spPr>
-      </p:pic>
-    </p:spTree>
-    <p:extLst>
-      <p:ext uri="{BB962C8B-B14F-4D97-AF65-F5344CB8AC3E}">
-        <p14:creationId xmlns:p14="http://schemas.microsoft.com/office/powerpoint/2010/main" val="3839847918"/>
       </p:ext>
     </p:extLst>
   </p:cSld>
@@ -26147,6 +26147,169 @@
         <p:cNvPr id="1" name="">
           <a:extLst>
             <a:ext uri="{FF2B5EF4-FFF2-40B4-BE49-F238E27FC236}">
+              <a16:creationId xmlns:a16="http://schemas.microsoft.com/office/drawing/2014/main" id="{C740FE29-64DC-0E92-4212-52A2B42FEA26}"/>
+            </a:ext>
+          </a:extLst>
+        </p:cNvPr>
+        <p:cNvGrpSpPr/>
+        <p:nvPr/>
+      </p:nvGrpSpPr>
+      <p:grpSpPr>
+        <a:xfrm>
+          <a:off x="0" y="0"/>
+          <a:ext cx="0" cy="0"/>
+          <a:chOff x="0" y="0"/>
+          <a:chExt cx="0" cy="0"/>
+        </a:xfrm>
+      </p:grpSpPr>
+      <p:sp>
+        <p:nvSpPr>
+          <p:cNvPr id="2" name="Title 1">
+            <a:extLst>
+              <a:ext uri="{FF2B5EF4-FFF2-40B4-BE49-F238E27FC236}">
+                <a16:creationId xmlns:a16="http://schemas.microsoft.com/office/drawing/2014/main" id="{F59B3BF4-3AA5-B73F-26B5-22A3DE5BA2D1}"/>
+              </a:ext>
+            </a:extLst>
+          </p:cNvPr>
+          <p:cNvSpPr>
+            <a:spLocks noGrp="1"/>
+          </p:cNvSpPr>
+          <p:nvPr>
+            <p:ph type="title"/>
+          </p:nvPr>
+        </p:nvSpPr>
+        <p:spPr>
+          <a:xfrm>
+            <a:off x="811185" y="621973"/>
+            <a:ext cx="10361120" cy="961899"/>
+          </a:xfrm>
+        </p:spPr>
+        <p:txBody>
+          <a:bodyPr/>
+          <a:lstStyle/>
+          <a:p>
+            <a:r>
+              <a:rPr lang="en-US" dirty="0"/>
+              <a:t>Setting Primary Keys in </a:t>
+            </a:r>
+            <a:r>
+              <a:rPr lang="en-US" dirty="0" err="1"/>
+              <a:t>BigQuery</a:t>
+            </a:r>
+            <a:endParaRPr lang="en-US" dirty="0"/>
+          </a:p>
+        </p:txBody>
+      </p:sp>
+      <p:sp>
+        <p:nvSpPr>
+          <p:cNvPr id="4" name="Footer Placeholder 3">
+            <a:extLst>
+              <a:ext uri="{FF2B5EF4-FFF2-40B4-BE49-F238E27FC236}">
+                <a16:creationId xmlns:a16="http://schemas.microsoft.com/office/drawing/2014/main" id="{BE1687C8-45F2-818D-4A63-77B530F67267}"/>
+              </a:ext>
+            </a:extLst>
+          </p:cNvPr>
+          <p:cNvSpPr>
+            <a:spLocks noGrp="1"/>
+          </p:cNvSpPr>
+          <p:nvPr>
+            <p:ph type="ftr" sz="quarter" idx="10"/>
+          </p:nvPr>
+        </p:nvSpPr>
+        <p:spPr/>
+        <p:txBody>
+          <a:bodyPr/>
+          <a:lstStyle/>
+          <a:p>
+            <a:r>
+              <a:rPr lang="en-US"/>
+              <a:t>PRESENTATION TITLE</a:t>
+            </a:r>
+            <a:endParaRPr lang="en-US" dirty="0"/>
+          </a:p>
+        </p:txBody>
+      </p:sp>
+      <p:sp>
+        <p:nvSpPr>
+          <p:cNvPr id="5" name="Slide Number Placeholder 4">
+            <a:extLst>
+              <a:ext uri="{FF2B5EF4-FFF2-40B4-BE49-F238E27FC236}">
+                <a16:creationId xmlns:a16="http://schemas.microsoft.com/office/drawing/2014/main" id="{85D26533-9E3F-DAC3-2CB4-D8113D9716EA}"/>
+              </a:ext>
+            </a:extLst>
+          </p:cNvPr>
+          <p:cNvSpPr>
+            <a:spLocks noGrp="1"/>
+          </p:cNvSpPr>
+          <p:nvPr>
+            <p:ph type="sldNum" sz="quarter" idx="11"/>
+          </p:nvPr>
+        </p:nvSpPr>
+        <p:spPr/>
+        <p:txBody>
+          <a:bodyPr/>
+          <a:lstStyle/>
+          <a:p>
+            <a:fld id="{B5CEABB6-07DC-46E8-9B57-56EC44A396E5}" type="slidenum">
+              <a:rPr lang="en-US" smtClean="0"/>
+              <a:pPr/>
+              <a:t>30</a:t>
+            </a:fld>
+            <a:endParaRPr lang="en-US" dirty="0"/>
+          </a:p>
+        </p:txBody>
+      </p:sp>
+      <p:pic>
+        <p:nvPicPr>
+          <p:cNvPr id="6" name="Picture 5">
+            <a:extLst>
+              <a:ext uri="{FF2B5EF4-FFF2-40B4-BE49-F238E27FC236}">
+                <a16:creationId xmlns:a16="http://schemas.microsoft.com/office/drawing/2014/main" id="{A04633B2-A3C4-D744-7CC2-DB12833B777A}"/>
+              </a:ext>
+            </a:extLst>
+          </p:cNvPr>
+          <p:cNvPicPr>
+            <a:picLocks noChangeAspect="1"/>
+          </p:cNvPicPr>
+          <p:nvPr/>
+        </p:nvPicPr>
+        <p:blipFill>
+          <a:blip r:embed="rId2"/>
+          <a:stretch>
+            <a:fillRect/>
+          </a:stretch>
+        </p:blipFill>
+        <p:spPr>
+          <a:xfrm>
+            <a:off x="0" y="1192382"/>
+            <a:ext cx="11741753" cy="5753396"/>
+          </a:xfrm>
+          <a:prstGeom prst="rect">
+            <a:avLst/>
+          </a:prstGeom>
+        </p:spPr>
+      </p:pic>
+    </p:spTree>
+    <p:extLst>
+      <p:ext uri="{BB962C8B-B14F-4D97-AF65-F5344CB8AC3E}">
+        <p14:creationId xmlns:p14="http://schemas.microsoft.com/office/powerpoint/2010/main" val="3839847918"/>
+      </p:ext>
+    </p:extLst>
+  </p:cSld>
+  <p:clrMapOvr>
+    <a:masterClrMapping/>
+  </p:clrMapOvr>
+</p:sld>
+</file>
+
+<file path=ppt/slides/slide31.xml><?xml version="1.0" encoding="utf-8"?>
+<p:sld xmlns:a="http://schemas.openxmlformats.org/drawingml/2006/main" xmlns:r="http://schemas.openxmlformats.org/officeDocument/2006/relationships" xmlns:p="http://schemas.openxmlformats.org/presentationml/2006/main">
+  <p:cSld>
+    <p:spTree>
+      <p:nvGrpSpPr>
+        <p:cNvPr id="1" name="">
+          <a:extLst>
+            <a:ext uri="{FF2B5EF4-FFF2-40B4-BE49-F238E27FC236}">
               <a16:creationId xmlns:a16="http://schemas.microsoft.com/office/drawing/2014/main" id="{92CA8C38-5AC7-A010-0B30-417610A1C614}"/>
             </a:ext>
           </a:extLst>
@@ -26248,7 +26411,7 @@
             <a:fld id="{B5CEABB6-07DC-46E8-9B57-56EC44A396E5}" type="slidenum">
               <a:rPr lang="en-US" smtClean="0"/>
               <a:pPr/>
-              <a:t>30</a:t>
+              <a:t>31</a:t>
             </a:fld>
             <a:endParaRPr lang="en-US" dirty="0"/>
           </a:p>
@@ -26297,7 +26460,7 @@
 </p:sld>
 </file>
 
-<file path=ppt/slides/slide31.xml><?xml version="1.0" encoding="utf-8"?>
+<file path=ppt/slides/slide32.xml><?xml version="1.0" encoding="utf-8"?>
 <p:sld xmlns:a="http://schemas.openxmlformats.org/drawingml/2006/main" xmlns:r="http://schemas.openxmlformats.org/officeDocument/2006/relationships" xmlns:p="http://schemas.openxmlformats.org/presentationml/2006/main">
   <p:cSld>
     <p:spTree>
@@ -26406,7 +26569,7 @@
             <a:fld id="{B5CEABB6-07DC-46E8-9B57-56EC44A396E5}" type="slidenum">
               <a:rPr lang="en-US" smtClean="0"/>
               <a:pPr/>
-              <a:t>31</a:t>
+              <a:t>32</a:t>
             </a:fld>
             <a:endParaRPr lang="en-US" dirty="0"/>
           </a:p>
@@ -26455,7 +26618,7 @@
 </p:sld>
 </file>
 
-<file path=ppt/slides/slide32.xml><?xml version="1.0" encoding="utf-8"?>
+<file path=ppt/slides/slide33.xml><?xml version="1.0" encoding="utf-8"?>
 <p:sld xmlns:a="http://schemas.openxmlformats.org/drawingml/2006/main" xmlns:r="http://schemas.openxmlformats.org/officeDocument/2006/relationships" xmlns:p="http://schemas.openxmlformats.org/presentationml/2006/main">
   <p:cSld>
     <p:spTree>
@@ -26564,7 +26727,7 @@
             <a:fld id="{B5CEABB6-07DC-46E8-9B57-56EC44A396E5}" type="slidenum">
               <a:rPr lang="en-US" smtClean="0"/>
               <a:pPr/>
-              <a:t>32</a:t>
+              <a:t>33</a:t>
             </a:fld>
             <a:endParaRPr lang="en-US" dirty="0"/>
           </a:p>
@@ -26613,7 +26776,7 @@
 </p:sld>
 </file>
 
-<file path=ppt/slides/slide33.xml><?xml version="1.0" encoding="utf-8"?>
+<file path=ppt/slides/slide34.xml><?xml version="1.0" encoding="utf-8"?>
 <p:sld xmlns:a="http://schemas.openxmlformats.org/drawingml/2006/main" xmlns:r="http://schemas.openxmlformats.org/officeDocument/2006/relationships" xmlns:p="http://schemas.openxmlformats.org/presentationml/2006/main">
   <p:cSld>
     <p:spTree>
@@ -26722,7 +26885,7 @@
             <a:fld id="{B5CEABB6-07DC-46E8-9B57-56EC44A396E5}" type="slidenum">
               <a:rPr lang="en-US" smtClean="0"/>
               <a:pPr/>
-              <a:t>33</a:t>
+              <a:t>34</a:t>
             </a:fld>
             <a:endParaRPr lang="en-US" dirty="0"/>
           </a:p>
@@ -26771,7 +26934,7 @@
 </p:sld>
 </file>
 
-<file path=ppt/slides/slide34.xml><?xml version="1.0" encoding="utf-8"?>
+<file path=ppt/slides/slide35.xml><?xml version="1.0" encoding="utf-8"?>
 <p:sld xmlns:a="http://schemas.openxmlformats.org/drawingml/2006/main" xmlns:r="http://schemas.openxmlformats.org/officeDocument/2006/relationships" xmlns:p="http://schemas.openxmlformats.org/presentationml/2006/main">
   <p:cSld>
     <p:spTree>
@@ -26888,7 +27051,7 @@
             <a:fld id="{B5CEABB6-07DC-46E8-9B57-56EC44A396E5}" type="slidenum">
               <a:rPr lang="en-US" smtClean="0"/>
               <a:pPr/>
-              <a:t>34</a:t>
+              <a:t>35</a:t>
             </a:fld>
             <a:endParaRPr lang="en-US" dirty="0"/>
           </a:p>
@@ -26937,7 +27100,7 @@
 </p:sld>
 </file>
 
-<file path=ppt/slides/slide35.xml><?xml version="1.0" encoding="utf-8"?>
+<file path=ppt/slides/slide36.xml><?xml version="1.0" encoding="utf-8"?>
 <p:sld xmlns:a="http://schemas.openxmlformats.org/drawingml/2006/main" xmlns:r="http://schemas.openxmlformats.org/officeDocument/2006/relationships" xmlns:p="http://schemas.openxmlformats.org/presentationml/2006/main">
   <p:cSld>
     <p:spTree>
@@ -27077,7 +27240,7 @@
             <a:fld id="{B5CEABB6-07DC-46E8-9B57-56EC44A396E5}" type="slidenum">
               <a:rPr lang="en-US" smtClean="0"/>
               <a:pPr/>
-              <a:t>35</a:t>
+              <a:t>36</a:t>
             </a:fld>
             <a:endParaRPr lang="en-US" dirty="0"/>
           </a:p>
@@ -27096,7 +27259,7 @@
 </p:sld>
 </file>
 
-<file path=ppt/slides/slide36.xml><?xml version="1.0" encoding="utf-8"?>
+<file path=ppt/slides/slide37.xml><?xml version="1.0" encoding="utf-8"?>
 <p:sld xmlns:a="http://schemas.openxmlformats.org/drawingml/2006/main" xmlns:r="http://schemas.openxmlformats.org/officeDocument/2006/relationships" xmlns:p="http://schemas.openxmlformats.org/presentationml/2006/main">
   <p:cSld>
     <p:spTree>
@@ -27459,7 +27622,7 @@
             <a:fld id="{B5CEABB6-07DC-46E8-9B57-56EC44A396E5}" type="slidenum">
               <a:rPr lang="en-US" smtClean="0"/>
               <a:pPr/>
-              <a:t>36</a:t>
+              <a:t>37</a:t>
             </a:fld>
             <a:endParaRPr lang="en-US" dirty="0"/>
           </a:p>
@@ -27478,7 +27641,7 @@
 </p:sld>
 </file>
 
-<file path=ppt/slides/slide37.xml><?xml version="1.0" encoding="utf-8"?>
+<file path=ppt/slides/slide38.xml><?xml version="1.0" encoding="utf-8"?>
 <p:sld xmlns:a="http://schemas.openxmlformats.org/drawingml/2006/main" xmlns:r="http://schemas.openxmlformats.org/officeDocument/2006/relationships" xmlns:p="http://schemas.openxmlformats.org/presentationml/2006/main">
   <p:cSld>
     <p:spTree>
@@ -27616,7 +27779,7 @@
             <a:fld id="{B5CEABB6-07DC-46E8-9B57-56EC44A396E5}" type="slidenum">
               <a:rPr lang="en-US" smtClean="0"/>
               <a:pPr/>
-              <a:t>37</a:t>
+              <a:t>38</a:t>
             </a:fld>
             <a:endParaRPr lang="en-US" dirty="0"/>
           </a:p>
@@ -27635,7 +27798,7 @@
 </p:sld>
 </file>
 
-<file path=ppt/slides/slide38.xml><?xml version="1.0" encoding="utf-8"?>
+<file path=ppt/slides/slide39.xml><?xml version="1.0" encoding="utf-8"?>
 <p:sld xmlns:a="http://schemas.openxmlformats.org/drawingml/2006/main" xmlns:r="http://schemas.openxmlformats.org/officeDocument/2006/relationships" xmlns:p="http://schemas.openxmlformats.org/presentationml/2006/main">
   <p:cSld>
     <p:spTree>
@@ -30132,15 +30295,6 @@
 </file>
 
 <file path=customXml/item1.xml><?xml version="1.0" encoding="utf-8"?>
-<?mso-contentType ?>
-<FormTemplates xmlns="http://schemas.microsoft.com/sharepoint/v3/contenttype/forms">
-  <Display>DocumentLibraryForm</Display>
-  <Edit>DocumentLibraryForm</Edit>
-  <New>DocumentLibraryForm</New>
-</FormTemplates>
-</file>
-
-<file path=customXml/item2.xml><?xml version="1.0" encoding="utf-8"?>
 <p:properties xmlns:p="http://schemas.microsoft.com/office/2006/metadata/properties" xmlns:xsi="http://www.w3.org/2001/XMLSchema-instance" xmlns:pc="http://schemas.microsoft.com/office/infopath/2007/PartnerControls">
   <documentManagement>
     <_ip_UnifiedCompliancePolicyUIAction xmlns="http://schemas.microsoft.com/sharepoint/v3" xsi:nil="true"/>
@@ -30160,7 +30314,7 @@
 </p:properties>
 </file>
 
-<file path=customXml/item3.xml><?xml version="1.0" encoding="utf-8"?>
+<file path=customXml/item2.xml><?xml version="1.0" encoding="utf-8"?>
 <ct:contentTypeSchema xmlns:ct="http://schemas.microsoft.com/office/2006/metadata/contentType" xmlns:ma="http://schemas.microsoft.com/office/2006/metadata/properties/metaAttributes" ct:_="" ma:_="" ma:contentTypeName="Document" ma:contentTypeID="0x01010079F111ED35F8CC479449609E8A0923A6" ma:contentTypeVersion="24" ma:contentTypeDescription="Create a new document." ma:contentTypeScope="" ma:versionID="2d714a3296df14eba7a100bb665443ca">
   <xsd:schema xmlns:xsd="http://www.w3.org/2001/XMLSchema" xmlns:xs="http://www.w3.org/2001/XMLSchema" xmlns:p="http://schemas.microsoft.com/office/2006/metadata/properties" xmlns:ns1="http://schemas.microsoft.com/sharepoint/v3" xmlns:ns2="71af3243-3dd4-4a8d-8c0d-dd76da1f02a5" xmlns:ns3="16c05727-aa75-4e4a-9b5f-8a80a1165891" xmlns:ns4="230e9df3-be65-4c73-a93b-d1236ebd677e" targetNamespace="http://schemas.microsoft.com/office/2006/metadata/properties" ma:root="true" ma:fieldsID="49549bf45bfbbfb6cffed527380e77e1" ns1:_="" ns2:_="" ns3:_="" ns4:_="">
     <xsd:import namespace="http://schemas.microsoft.com/sharepoint/v3"/>
@@ -30448,15 +30602,16 @@
 </ct:contentTypeSchema>
 </file>
 
-<file path=customXml/itemProps1.xml><?xml version="1.0" encoding="utf-8"?>
-<ds:datastoreItem xmlns:ds="http://schemas.openxmlformats.org/officeDocument/2006/customXml" ds:itemID="{F37CE065-66B7-4F0E-946A-AB3C0E53962A}">
-  <ds:schemaRefs>
-    <ds:schemaRef ds:uri="http://schemas.microsoft.com/sharepoint/v3/contenttype/forms"/>
-  </ds:schemaRefs>
-</ds:datastoreItem>
+<file path=customXml/item3.xml><?xml version="1.0" encoding="utf-8"?>
+<?mso-contentType ?>
+<FormTemplates xmlns="http://schemas.microsoft.com/sharepoint/v3/contenttype/forms">
+  <Display>DocumentLibraryForm</Display>
+  <Edit>DocumentLibraryForm</Edit>
+  <New>DocumentLibraryForm</New>
+</FormTemplates>
 </file>
 
-<file path=customXml/itemProps2.xml><?xml version="1.0" encoding="utf-8"?>
+<file path=customXml/itemProps1.xml><?xml version="1.0" encoding="utf-8"?>
 <ds:datastoreItem xmlns:ds="http://schemas.openxmlformats.org/officeDocument/2006/customXml" ds:itemID="{AF229B82-2C15-48C7-81C4-60933CA1C9E6}">
   <ds:schemaRefs>
     <ds:schemaRef ds:uri="http://schemas.microsoft.com/office/2006/metadata/properties"/>
@@ -30468,7 +30623,7 @@
 </ds:datastoreItem>
 </file>
 
-<file path=customXml/itemProps3.xml><?xml version="1.0" encoding="utf-8"?>
+<file path=customXml/itemProps2.xml><?xml version="1.0" encoding="utf-8"?>
 <ds:datastoreItem xmlns:ds="http://schemas.openxmlformats.org/officeDocument/2006/customXml" ds:itemID="{03775E1D-CEA1-47AF-BBAA-C0FEE5CAA533}">
   <ds:schemaRefs>
     <ds:schemaRef ds:uri="http://schemas.microsoft.com/office/2006/metadata/contentType"/>
@@ -30489,6 +30644,14 @@
 </ds:datastoreItem>
 </file>
 
+<file path=customXml/itemProps3.xml><?xml version="1.0" encoding="utf-8"?>
+<ds:datastoreItem xmlns:ds="http://schemas.openxmlformats.org/officeDocument/2006/customXml" ds:itemID="{F37CE065-66B7-4F0E-946A-AB3C0E53962A}">
+  <ds:schemaRefs>
+    <ds:schemaRef ds:uri="http://schemas.microsoft.com/sharepoint/v3/contenttype/forms"/>
+  </ds:schemaRefs>
+</ds:datastoreItem>
+</file>
+
 <file path=docMetadata/LabelInfo.xml><?xml version="1.0" encoding="utf-8"?>
 <clbl:labelList xmlns:clbl="http://schemas.microsoft.com/office/2020/mipLabelMetadata"/>
 </file>
</xml_diff>